<commit_message>
Update logo Lightning Network
</commit_message>
<xml_diff>
--- a/logo lightning network/bitcoin logo lightning network.pptx
+++ b/logo lightning network/bitcoin logo lightning network.pptx
@@ -5,7 +5,7 @@
     <p:sldMasterId id="2147483672" r:id="rId1"/>
   </p:sldMasterIdLst>
   <p:sldIdLst>
-    <p:sldId id="256" r:id="rId2"/>
+    <p:sldId id="263" r:id="rId2"/>
   </p:sldIdLst>
   <p:sldSz cx="9720263" cy="3240088"/>
   <p:notesSz cx="6858000" cy="9144000"/>
@@ -115,7 +115,7 @@
 <file path=ppt/revisionInfo.xml><?xml version="1.0" encoding="utf-8"?>
 <p1510:revInfo xmlns:a="http://schemas.openxmlformats.org/drawingml/2006/main" xmlns:r="http://schemas.openxmlformats.org/officeDocument/2006/relationships" xmlns:p1510="http://schemas.microsoft.com/office/powerpoint/2015/10/main">
   <p1510:revLst>
-    <p1510:client id="{2218B6E8-24DD-4828-A50C-A6BF04826C01}" v="63" dt="2024-03-09T05:52:30.637"/>
+    <p1510:client id="{AA8653F4-E423-4F5B-B596-0F4968636A06}" v="137" dt="2024-03-15T19:44:42.649"/>
   </p1510:revLst>
 </p1510:revInfo>
 </file>
@@ -751,6 +751,454 @@
             <ac:cxnSpMk id="17" creationId="{5C9DB851-70ED-5497-D11D-A59F8BD022B2}"/>
           </ac:cxnSpMkLst>
         </pc:cxnChg>
+      </pc:sldChg>
+    </pc:docChg>
+  </pc:docChgLst>
+  <pc:docChgLst>
+    <pc:chgData name="Tomi Lind" userId="73fe6e1701840021" providerId="LiveId" clId="{AA8653F4-E423-4F5B-B596-0F4968636A06}"/>
+    <pc:docChg chg="undo redo custSel addSld delSld modSld sldOrd">
+      <pc:chgData name="Tomi Lind" userId="73fe6e1701840021" providerId="LiveId" clId="{AA8653F4-E423-4F5B-B596-0F4968636A06}" dt="2024-03-15T20:00:41.819" v="491" actId="47"/>
+      <pc:docMkLst>
+        <pc:docMk/>
+      </pc:docMkLst>
+      <pc:sldChg chg="addSp delSp modSp del mod ord">
+        <pc:chgData name="Tomi Lind" userId="73fe6e1701840021" providerId="LiveId" clId="{AA8653F4-E423-4F5B-B596-0F4968636A06}" dt="2024-03-15T20:00:41.819" v="491" actId="47"/>
+        <pc:sldMkLst>
+          <pc:docMk/>
+          <pc:sldMk cId="560821162" sldId="256"/>
+        </pc:sldMkLst>
+        <pc:spChg chg="mod">
+          <ac:chgData name="Tomi Lind" userId="73fe6e1701840021" providerId="LiveId" clId="{AA8653F4-E423-4F5B-B596-0F4968636A06}" dt="2024-03-15T19:20:14.263" v="144" actId="14100"/>
+          <ac:spMkLst>
+            <pc:docMk/>
+            <pc:sldMk cId="560821162" sldId="256"/>
+            <ac:spMk id="3" creationId="{C404225F-4EB9-154C-370B-F266805E2500}"/>
+          </ac:spMkLst>
+        </pc:spChg>
+        <pc:spChg chg="mod">
+          <ac:chgData name="Tomi Lind" userId="73fe6e1701840021" providerId="LiveId" clId="{AA8653F4-E423-4F5B-B596-0F4968636A06}" dt="2024-03-15T19:33:36.583" v="304" actId="113"/>
+          <ac:spMkLst>
+            <pc:docMk/>
+            <pc:sldMk cId="560821162" sldId="256"/>
+            <ac:spMk id="4" creationId="{6A27C49D-2631-B0BB-B113-6105C713D41F}"/>
+          </ac:spMkLst>
+        </pc:spChg>
+        <pc:grpChg chg="mod">
+          <ac:chgData name="Tomi Lind" userId="73fe6e1701840021" providerId="LiveId" clId="{AA8653F4-E423-4F5B-B596-0F4968636A06}" dt="2024-03-15T19:20:14.263" v="144" actId="14100"/>
+          <ac:grpSpMkLst>
+            <pc:docMk/>
+            <pc:sldMk cId="560821162" sldId="256"/>
+            <ac:grpSpMk id="38" creationId="{903AFFB8-7333-CA7E-3061-936D3CC39B64}"/>
+          </ac:grpSpMkLst>
+        </pc:grpChg>
+        <pc:picChg chg="add mod">
+          <ac:chgData name="Tomi Lind" userId="73fe6e1701840021" providerId="LiveId" clId="{AA8653F4-E423-4F5B-B596-0F4968636A06}" dt="2024-03-15T19:14:11.309" v="25" actId="14100"/>
+          <ac:picMkLst>
+            <pc:docMk/>
+            <pc:sldMk cId="560821162" sldId="256"/>
+            <ac:picMk id="5" creationId="{72D4F2BF-45F1-F1D5-A779-2C48D034B8A8}"/>
+          </ac:picMkLst>
+        </pc:picChg>
+        <pc:picChg chg="del">
+          <ac:chgData name="Tomi Lind" userId="73fe6e1701840021" providerId="LiveId" clId="{AA8653F4-E423-4F5B-B596-0F4968636A06}" dt="2024-03-15T19:13:15.769" v="0" actId="478"/>
+          <ac:picMkLst>
+            <pc:docMk/>
+            <pc:sldMk cId="560821162" sldId="256"/>
+            <ac:picMk id="8" creationId="{C8C7D250-F7FA-F5AD-F725-AF2E29BC85E5}"/>
+          </ac:picMkLst>
+        </pc:picChg>
+        <pc:cxnChg chg="add del mod">
+          <ac:chgData name="Tomi Lind" userId="73fe6e1701840021" providerId="LiveId" clId="{AA8653F4-E423-4F5B-B596-0F4968636A06}" dt="2024-03-15T19:30:16.494" v="239" actId="11529"/>
+          <ac:cxnSpMkLst>
+            <pc:docMk/>
+            <pc:sldMk cId="560821162" sldId="256"/>
+            <ac:cxnSpMk id="7" creationId="{42998D93-0904-056C-D0AF-0A70FA58BF32}"/>
+          </ac:cxnSpMkLst>
+        </pc:cxnChg>
+        <pc:cxnChg chg="add mod">
+          <ac:chgData name="Tomi Lind" userId="73fe6e1701840021" providerId="LiveId" clId="{AA8653F4-E423-4F5B-B596-0F4968636A06}" dt="2024-03-15T19:30:14.650" v="236" actId="1076"/>
+          <ac:cxnSpMkLst>
+            <pc:docMk/>
+            <pc:sldMk cId="560821162" sldId="256"/>
+            <ac:cxnSpMk id="9" creationId="{7DCEC98F-C841-6E61-6D99-28742D209161}"/>
+          </ac:cxnSpMkLst>
+        </pc:cxnChg>
+      </pc:sldChg>
+      <pc:sldChg chg="addSp delSp modSp add del mod ord">
+        <pc:chgData name="Tomi Lind" userId="73fe6e1701840021" providerId="LiveId" clId="{AA8653F4-E423-4F5B-B596-0F4968636A06}" dt="2024-03-15T20:00:41.819" v="491" actId="47"/>
+        <pc:sldMkLst>
+          <pc:docMk/>
+          <pc:sldMk cId="796578775" sldId="257"/>
+        </pc:sldMkLst>
+        <pc:spChg chg="mod">
+          <ac:chgData name="Tomi Lind" userId="73fe6e1701840021" providerId="LiveId" clId="{AA8653F4-E423-4F5B-B596-0F4968636A06}" dt="2024-03-15T19:18:23.336" v="114" actId="14100"/>
+          <ac:spMkLst>
+            <pc:docMk/>
+            <pc:sldMk cId="796578775" sldId="257"/>
+            <ac:spMk id="3" creationId="{C404225F-4EB9-154C-370B-F266805E2500}"/>
+          </ac:spMkLst>
+        </pc:spChg>
+        <pc:spChg chg="mod">
+          <ac:chgData name="Tomi Lind" userId="73fe6e1701840021" providerId="LiveId" clId="{AA8653F4-E423-4F5B-B596-0F4968636A06}" dt="2024-03-15T19:33:45.795" v="305" actId="113"/>
+          <ac:spMkLst>
+            <pc:docMk/>
+            <pc:sldMk cId="796578775" sldId="257"/>
+            <ac:spMk id="4" creationId="{6A27C49D-2631-B0BB-B113-6105C713D41F}"/>
+          </ac:spMkLst>
+        </pc:spChg>
+        <pc:grpChg chg="mod">
+          <ac:chgData name="Tomi Lind" userId="73fe6e1701840021" providerId="LiveId" clId="{AA8653F4-E423-4F5B-B596-0F4968636A06}" dt="2024-03-15T19:18:23.336" v="114" actId="14100"/>
+          <ac:grpSpMkLst>
+            <pc:docMk/>
+            <pc:sldMk cId="796578775" sldId="257"/>
+            <ac:grpSpMk id="38" creationId="{903AFFB8-7333-CA7E-3061-936D3CC39B64}"/>
+          </ac:grpSpMkLst>
+        </pc:grpChg>
+        <pc:picChg chg="mod">
+          <ac:chgData name="Tomi Lind" userId="73fe6e1701840021" providerId="LiveId" clId="{AA8653F4-E423-4F5B-B596-0F4968636A06}" dt="2024-03-15T19:29:10.584" v="212" actId="14100"/>
+          <ac:picMkLst>
+            <pc:docMk/>
+            <pc:sldMk cId="796578775" sldId="257"/>
+            <ac:picMk id="5" creationId="{72D4F2BF-45F1-F1D5-A779-2C48D034B8A8}"/>
+          </ac:picMkLst>
+        </pc:picChg>
+        <pc:cxnChg chg="add del mod">
+          <ac:chgData name="Tomi Lind" userId="73fe6e1701840021" providerId="LiveId" clId="{AA8653F4-E423-4F5B-B596-0F4968636A06}" dt="2024-03-15T19:29:16.646" v="214" actId="478"/>
+          <ac:cxnSpMkLst>
+            <pc:docMk/>
+            <pc:sldMk cId="796578775" sldId="257"/>
+            <ac:cxnSpMk id="6" creationId="{584C062E-EDB1-60E8-3706-EBEA0F411411}"/>
+          </ac:cxnSpMkLst>
+        </pc:cxnChg>
+        <pc:cxnChg chg="add del mod">
+          <ac:chgData name="Tomi Lind" userId="73fe6e1701840021" providerId="LiveId" clId="{AA8653F4-E423-4F5B-B596-0F4968636A06}" dt="2024-03-15T19:29:15.496" v="213" actId="478"/>
+          <ac:cxnSpMkLst>
+            <pc:docMk/>
+            <pc:sldMk cId="796578775" sldId="257"/>
+            <ac:cxnSpMk id="7" creationId="{69D05FF7-512B-49B6-EF2C-B486E62A0132}"/>
+          </ac:cxnSpMkLst>
+        </pc:cxnChg>
+      </pc:sldChg>
+      <pc:sldChg chg="addSp delSp modSp add del mod ord">
+        <pc:chgData name="Tomi Lind" userId="73fe6e1701840021" providerId="LiveId" clId="{AA8653F4-E423-4F5B-B596-0F4968636A06}" dt="2024-03-15T20:00:41.819" v="491" actId="47"/>
+        <pc:sldMkLst>
+          <pc:docMk/>
+          <pc:sldMk cId="3354729645" sldId="258"/>
+        </pc:sldMkLst>
+        <pc:spChg chg="mod">
+          <ac:chgData name="Tomi Lind" userId="73fe6e1701840021" providerId="LiveId" clId="{AA8653F4-E423-4F5B-B596-0F4968636A06}" dt="2024-03-15T19:31:01.527" v="244" actId="14100"/>
+          <ac:spMkLst>
+            <pc:docMk/>
+            <pc:sldMk cId="3354729645" sldId="258"/>
+            <ac:spMk id="3" creationId="{C404225F-4EB9-154C-370B-F266805E2500}"/>
+          </ac:spMkLst>
+        </pc:spChg>
+        <pc:spChg chg="mod">
+          <ac:chgData name="Tomi Lind" userId="73fe6e1701840021" providerId="LiveId" clId="{AA8653F4-E423-4F5B-B596-0F4968636A06}" dt="2024-03-15T19:33:50.976" v="306" actId="113"/>
+          <ac:spMkLst>
+            <pc:docMk/>
+            <pc:sldMk cId="3354729645" sldId="258"/>
+            <ac:spMk id="4" creationId="{6A27C49D-2631-B0BB-B113-6105C713D41F}"/>
+          </ac:spMkLst>
+        </pc:spChg>
+        <pc:grpChg chg="mod">
+          <ac:chgData name="Tomi Lind" userId="73fe6e1701840021" providerId="LiveId" clId="{AA8653F4-E423-4F5B-B596-0F4968636A06}" dt="2024-03-15T19:31:01.527" v="244" actId="14100"/>
+          <ac:grpSpMkLst>
+            <pc:docMk/>
+            <pc:sldMk cId="3354729645" sldId="258"/>
+            <ac:grpSpMk id="38" creationId="{903AFFB8-7333-CA7E-3061-936D3CC39B64}"/>
+          </ac:grpSpMkLst>
+        </pc:grpChg>
+        <pc:picChg chg="add mod ord">
+          <ac:chgData name="Tomi Lind" userId="73fe6e1701840021" providerId="LiveId" clId="{AA8653F4-E423-4F5B-B596-0F4968636A06}" dt="2024-03-15T19:29:32.286" v="219" actId="167"/>
+          <ac:picMkLst>
+            <pc:docMk/>
+            <pc:sldMk cId="3354729645" sldId="258"/>
+            <ac:picMk id="2" creationId="{20826337-FF57-BDB6-9CE4-F1F24658B382}"/>
+          </ac:picMkLst>
+        </pc:picChg>
+        <pc:picChg chg="del">
+          <ac:chgData name="Tomi Lind" userId="73fe6e1701840021" providerId="LiveId" clId="{AA8653F4-E423-4F5B-B596-0F4968636A06}" dt="2024-03-15T19:29:33.697" v="220" actId="478"/>
+          <ac:picMkLst>
+            <pc:docMk/>
+            <pc:sldMk cId="3354729645" sldId="258"/>
+            <ac:picMk id="5" creationId="{72D4F2BF-45F1-F1D5-A779-2C48D034B8A8}"/>
+          </ac:picMkLst>
+        </pc:picChg>
+      </pc:sldChg>
+      <pc:sldChg chg="addSp delSp modSp add del mod ord">
+        <pc:chgData name="Tomi Lind" userId="73fe6e1701840021" providerId="LiveId" clId="{AA8653F4-E423-4F5B-B596-0F4968636A06}" dt="2024-03-15T20:00:41.819" v="491" actId="47"/>
+        <pc:sldMkLst>
+          <pc:docMk/>
+          <pc:sldMk cId="807062658" sldId="259"/>
+        </pc:sldMkLst>
+        <pc:spChg chg="mod">
+          <ac:chgData name="Tomi Lind" userId="73fe6e1701840021" providerId="LiveId" clId="{AA8653F4-E423-4F5B-B596-0F4968636A06}" dt="2024-03-15T19:25:01.366" v="147" actId="113"/>
+          <ac:spMkLst>
+            <pc:docMk/>
+            <pc:sldMk cId="807062658" sldId="259"/>
+            <ac:spMk id="4" creationId="{6A27C49D-2631-B0BB-B113-6105C713D41F}"/>
+          </ac:spMkLst>
+        </pc:spChg>
+        <pc:picChg chg="add del mod">
+          <ac:chgData name="Tomi Lind" userId="73fe6e1701840021" providerId="LiveId" clId="{AA8653F4-E423-4F5B-B596-0F4968636A06}" dt="2024-03-15T19:29:45.168" v="221" actId="478"/>
+          <ac:picMkLst>
+            <pc:docMk/>
+            <pc:sldMk cId="807062658" sldId="259"/>
+            <ac:picMk id="2" creationId="{5BCCEF5A-5F88-F682-EB83-E5054B678E55}"/>
+          </ac:picMkLst>
+        </pc:picChg>
+        <pc:picChg chg="del">
+          <ac:chgData name="Tomi Lind" userId="73fe6e1701840021" providerId="LiveId" clId="{AA8653F4-E423-4F5B-B596-0F4968636A06}" dt="2024-03-15T19:29:52.951" v="224" actId="478"/>
+          <ac:picMkLst>
+            <pc:docMk/>
+            <pc:sldMk cId="807062658" sldId="259"/>
+            <ac:picMk id="5" creationId="{72D4F2BF-45F1-F1D5-A779-2C48D034B8A8}"/>
+          </ac:picMkLst>
+        </pc:picChg>
+        <pc:picChg chg="add mod ord">
+          <ac:chgData name="Tomi Lind" userId="73fe6e1701840021" providerId="LiveId" clId="{AA8653F4-E423-4F5B-B596-0F4968636A06}" dt="2024-03-15T19:29:51.107" v="223" actId="167"/>
+          <ac:picMkLst>
+            <pc:docMk/>
+            <pc:sldMk cId="807062658" sldId="259"/>
+            <ac:picMk id="6" creationId="{33EA1CAC-95D5-8FFA-54BF-987D4DACEB21}"/>
+          </ac:picMkLst>
+        </pc:picChg>
+      </pc:sldChg>
+      <pc:sldChg chg="modSp add del mod ord">
+        <pc:chgData name="Tomi Lind" userId="73fe6e1701840021" providerId="LiveId" clId="{AA8653F4-E423-4F5B-B596-0F4968636A06}" dt="2024-03-15T20:00:41.819" v="491" actId="47"/>
+        <pc:sldMkLst>
+          <pc:docMk/>
+          <pc:sldMk cId="3535406007" sldId="260"/>
+        </pc:sldMkLst>
+        <pc:spChg chg="mod">
+          <ac:chgData name="Tomi Lind" userId="73fe6e1701840021" providerId="LiveId" clId="{AA8653F4-E423-4F5B-B596-0F4968636A06}" dt="2024-03-15T19:20:01.064" v="142" actId="14100"/>
+          <ac:spMkLst>
+            <pc:docMk/>
+            <pc:sldMk cId="3535406007" sldId="260"/>
+            <ac:spMk id="3" creationId="{C404225F-4EB9-154C-370B-F266805E2500}"/>
+          </ac:spMkLst>
+        </pc:spChg>
+        <pc:spChg chg="mod">
+          <ac:chgData name="Tomi Lind" userId="73fe6e1701840021" providerId="LiveId" clId="{AA8653F4-E423-4F5B-B596-0F4968636A06}" dt="2024-03-15T19:33:32.097" v="303" actId="113"/>
+          <ac:spMkLst>
+            <pc:docMk/>
+            <pc:sldMk cId="3535406007" sldId="260"/>
+            <ac:spMk id="4" creationId="{6A27C49D-2631-B0BB-B113-6105C713D41F}"/>
+          </ac:spMkLst>
+        </pc:spChg>
+        <pc:grpChg chg="mod">
+          <ac:chgData name="Tomi Lind" userId="73fe6e1701840021" providerId="LiveId" clId="{AA8653F4-E423-4F5B-B596-0F4968636A06}" dt="2024-03-15T19:20:01.064" v="142" actId="14100"/>
+          <ac:grpSpMkLst>
+            <pc:docMk/>
+            <pc:sldMk cId="3535406007" sldId="260"/>
+            <ac:grpSpMk id="38" creationId="{903AFFB8-7333-CA7E-3061-936D3CC39B64}"/>
+          </ac:grpSpMkLst>
+        </pc:grpChg>
+      </pc:sldChg>
+      <pc:sldChg chg="modSp add del mod ord">
+        <pc:chgData name="Tomi Lind" userId="73fe6e1701840021" providerId="LiveId" clId="{AA8653F4-E423-4F5B-B596-0F4968636A06}" dt="2024-03-15T20:00:41.819" v="491" actId="47"/>
+        <pc:sldMkLst>
+          <pc:docMk/>
+          <pc:sldMk cId="521740206" sldId="261"/>
+        </pc:sldMkLst>
+        <pc:spChg chg="mod">
+          <ac:chgData name="Tomi Lind" userId="73fe6e1701840021" providerId="LiveId" clId="{AA8653F4-E423-4F5B-B596-0F4968636A06}" dt="2024-03-15T19:26:49.048" v="201" actId="255"/>
+          <ac:spMkLst>
+            <pc:docMk/>
+            <pc:sldMk cId="521740206" sldId="261"/>
+            <ac:spMk id="4" creationId="{6A27C49D-2631-B0BB-B113-6105C713D41F}"/>
+          </ac:spMkLst>
+        </pc:spChg>
+      </pc:sldChg>
+      <pc:sldChg chg="modSp add del mod">
+        <pc:chgData name="Tomi Lind" userId="73fe6e1701840021" providerId="LiveId" clId="{AA8653F4-E423-4F5B-B596-0F4968636A06}" dt="2024-03-15T20:00:41.819" v="491" actId="47"/>
+        <pc:sldMkLst>
+          <pc:docMk/>
+          <pc:sldMk cId="4291448131" sldId="262"/>
+        </pc:sldMkLst>
+        <pc:spChg chg="mod">
+          <ac:chgData name="Tomi Lind" userId="73fe6e1701840021" providerId="LiveId" clId="{AA8653F4-E423-4F5B-B596-0F4968636A06}" dt="2024-03-15T19:33:13.770" v="302" actId="255"/>
+          <ac:spMkLst>
+            <pc:docMk/>
+            <pc:sldMk cId="4291448131" sldId="262"/>
+            <ac:spMk id="4" creationId="{6A27C49D-2631-B0BB-B113-6105C713D41F}"/>
+          </ac:spMkLst>
+        </pc:spChg>
+      </pc:sldChg>
+      <pc:sldChg chg="addSp modSp add mod ord">
+        <pc:chgData name="Tomi Lind" userId="73fe6e1701840021" providerId="LiveId" clId="{AA8653F4-E423-4F5B-B596-0F4968636A06}" dt="2024-03-15T19:46:58.195" v="490" actId="14100"/>
+        <pc:sldMkLst>
+          <pc:docMk/>
+          <pc:sldMk cId="110841472" sldId="263"/>
+        </pc:sldMkLst>
+        <pc:spChg chg="add">
+          <ac:chgData name="Tomi Lind" userId="73fe6e1701840021" providerId="LiveId" clId="{AA8653F4-E423-4F5B-B596-0F4968636A06}" dt="2024-03-15T19:35:36.942" v="307"/>
+          <ac:spMkLst>
+            <pc:docMk/>
+            <pc:sldMk cId="110841472" sldId="263"/>
+            <ac:spMk id="2" creationId="{FC273062-5C4A-F754-0CED-EF4CD815FD8F}"/>
+          </ac:spMkLst>
+        </pc:spChg>
+        <pc:spChg chg="mod">
+          <ac:chgData name="Tomi Lind" userId="73fe6e1701840021" providerId="LiveId" clId="{AA8653F4-E423-4F5B-B596-0F4968636A06}" dt="2024-03-15T19:44:42.632" v="483" actId="14100"/>
+          <ac:spMkLst>
+            <pc:docMk/>
+            <pc:sldMk cId="110841472" sldId="263"/>
+            <ac:spMk id="3" creationId="{C404225F-4EB9-154C-370B-F266805E2500}"/>
+          </ac:spMkLst>
+        </pc:spChg>
+        <pc:spChg chg="mod">
+          <ac:chgData name="Tomi Lind" userId="73fe6e1701840021" providerId="LiveId" clId="{AA8653F4-E423-4F5B-B596-0F4968636A06}" dt="2024-03-15T19:44:46.050" v="484" actId="255"/>
+          <ac:spMkLst>
+            <pc:docMk/>
+            <pc:sldMk cId="110841472" sldId="263"/>
+            <ac:spMk id="4" creationId="{6A27C49D-2631-B0BB-B113-6105C713D41F}"/>
+          </ac:spMkLst>
+        </pc:spChg>
+        <pc:spChg chg="add mod">
+          <ac:chgData name="Tomi Lind" userId="73fe6e1701840021" providerId="LiveId" clId="{AA8653F4-E423-4F5B-B596-0F4968636A06}" dt="2024-03-15T19:35:44.164" v="310" actId="14100"/>
+          <ac:spMkLst>
+            <pc:docMk/>
+            <pc:sldMk cId="110841472" sldId="263"/>
+            <ac:spMk id="6" creationId="{A61D8B19-3694-E745-E642-5E7C6C49A81B}"/>
+          </ac:spMkLst>
+        </pc:spChg>
+        <pc:spChg chg="add mod">
+          <ac:chgData name="Tomi Lind" userId="73fe6e1701840021" providerId="LiveId" clId="{AA8653F4-E423-4F5B-B596-0F4968636A06}" dt="2024-03-15T19:35:56.255" v="312"/>
+          <ac:spMkLst>
+            <pc:docMk/>
+            <pc:sldMk cId="110841472" sldId="263"/>
+            <ac:spMk id="7" creationId="{3B5F9EDA-3B1F-5244-547E-07D164A072ED}"/>
+          </ac:spMkLst>
+        </pc:spChg>
+        <pc:spChg chg="mod">
+          <ac:chgData name="Tomi Lind" userId="73fe6e1701840021" providerId="LiveId" clId="{AA8653F4-E423-4F5B-B596-0F4968636A06}" dt="2024-03-15T19:41:10.438" v="433" actId="571"/>
+          <ac:spMkLst>
+            <pc:docMk/>
+            <pc:sldMk cId="110841472" sldId="263"/>
+            <ac:spMk id="9" creationId="{3582AAD9-F3FF-56CD-C18B-C723A4AEB3B2}"/>
+          </ac:spMkLst>
+        </pc:spChg>
+        <pc:spChg chg="mod">
+          <ac:chgData name="Tomi Lind" userId="73fe6e1701840021" providerId="LiveId" clId="{AA8653F4-E423-4F5B-B596-0F4968636A06}" dt="2024-03-15T19:41:10.438" v="433" actId="571"/>
+          <ac:spMkLst>
+            <pc:docMk/>
+            <pc:sldMk cId="110841472" sldId="263"/>
+            <ac:spMk id="10" creationId="{0982A4D7-75D6-10A0-DFEF-16ABF203AF8A}"/>
+          </ac:spMkLst>
+        </pc:spChg>
+        <pc:spChg chg="mod">
+          <ac:chgData name="Tomi Lind" userId="73fe6e1701840021" providerId="LiveId" clId="{AA8653F4-E423-4F5B-B596-0F4968636A06}" dt="2024-03-15T19:41:19.513" v="435" actId="571"/>
+          <ac:spMkLst>
+            <pc:docMk/>
+            <pc:sldMk cId="110841472" sldId="263"/>
+            <ac:spMk id="13" creationId="{37D837CB-774D-5AE0-C7E8-840168DFA2C6}"/>
+          </ac:spMkLst>
+        </pc:spChg>
+        <pc:spChg chg="mod">
+          <ac:chgData name="Tomi Lind" userId="73fe6e1701840021" providerId="LiveId" clId="{AA8653F4-E423-4F5B-B596-0F4968636A06}" dt="2024-03-15T19:41:19.513" v="435" actId="571"/>
+          <ac:spMkLst>
+            <pc:docMk/>
+            <pc:sldMk cId="110841472" sldId="263"/>
+            <ac:spMk id="14" creationId="{536648D1-541B-403F-92C9-AE1E95B74C61}"/>
+          </ac:spMkLst>
+        </pc:spChg>
+        <pc:spChg chg="mod">
+          <ac:chgData name="Tomi Lind" userId="73fe6e1701840021" providerId="LiveId" clId="{AA8653F4-E423-4F5B-B596-0F4968636A06}" dt="2024-03-15T19:41:28.797" v="437" actId="571"/>
+          <ac:spMkLst>
+            <pc:docMk/>
+            <pc:sldMk cId="110841472" sldId="263"/>
+            <ac:spMk id="17" creationId="{9695C140-C31E-B8BF-983E-84CAEB17FA75}"/>
+          </ac:spMkLst>
+        </pc:spChg>
+        <pc:spChg chg="mod">
+          <ac:chgData name="Tomi Lind" userId="73fe6e1701840021" providerId="LiveId" clId="{AA8653F4-E423-4F5B-B596-0F4968636A06}" dt="2024-03-15T19:41:28.797" v="437" actId="571"/>
+          <ac:spMkLst>
+            <pc:docMk/>
+            <pc:sldMk cId="110841472" sldId="263"/>
+            <ac:spMk id="18" creationId="{2EC4661B-E69C-8ED5-AC8B-A0EBD22C1BD6}"/>
+          </ac:spMkLst>
+        </pc:spChg>
+        <pc:grpChg chg="add mod">
+          <ac:chgData name="Tomi Lind" userId="73fe6e1701840021" providerId="LiveId" clId="{AA8653F4-E423-4F5B-B596-0F4968636A06}" dt="2024-03-15T19:41:10.438" v="433" actId="571"/>
+          <ac:grpSpMkLst>
+            <pc:docMk/>
+            <pc:sldMk cId="110841472" sldId="263"/>
+            <ac:grpSpMk id="8" creationId="{479CBDB7-7AD2-897C-16F8-914B9874DD1F}"/>
+          </ac:grpSpMkLst>
+        </pc:grpChg>
+        <pc:grpChg chg="add mod">
+          <ac:chgData name="Tomi Lind" userId="73fe6e1701840021" providerId="LiveId" clId="{AA8653F4-E423-4F5B-B596-0F4968636A06}" dt="2024-03-15T19:41:19.513" v="435" actId="571"/>
+          <ac:grpSpMkLst>
+            <pc:docMk/>
+            <pc:sldMk cId="110841472" sldId="263"/>
+            <ac:grpSpMk id="12" creationId="{A781DD5F-16AE-2D8D-0C88-A8C3CAF4A313}"/>
+          </ac:grpSpMkLst>
+        </pc:grpChg>
+        <pc:grpChg chg="add mod">
+          <ac:chgData name="Tomi Lind" userId="73fe6e1701840021" providerId="LiveId" clId="{AA8653F4-E423-4F5B-B596-0F4968636A06}" dt="2024-03-15T19:41:28.797" v="437" actId="571"/>
+          <ac:grpSpMkLst>
+            <pc:docMk/>
+            <pc:sldMk cId="110841472" sldId="263"/>
+            <ac:grpSpMk id="16" creationId="{BBD4AFA0-F845-310D-7936-D8155CF57877}"/>
+          </ac:grpSpMkLst>
+        </pc:grpChg>
+        <pc:grpChg chg="mod">
+          <ac:chgData name="Tomi Lind" userId="73fe6e1701840021" providerId="LiveId" clId="{AA8653F4-E423-4F5B-B596-0F4968636A06}" dt="2024-03-15T19:44:42.632" v="483" actId="14100"/>
+          <ac:grpSpMkLst>
+            <pc:docMk/>
+            <pc:sldMk cId="110841472" sldId="263"/>
+            <ac:grpSpMk id="38" creationId="{903AFFB8-7333-CA7E-3061-936D3CC39B64}"/>
+          </ac:grpSpMkLst>
+        </pc:grpChg>
+        <pc:picChg chg="mod">
+          <ac:chgData name="Tomi Lind" userId="73fe6e1701840021" providerId="LiveId" clId="{AA8653F4-E423-4F5B-B596-0F4968636A06}" dt="2024-03-15T19:46:58.195" v="490" actId="14100"/>
+          <ac:picMkLst>
+            <pc:docMk/>
+            <pc:sldMk cId="110841472" sldId="263"/>
+            <ac:picMk id="5" creationId="{72D4F2BF-45F1-F1D5-A779-2C48D034B8A8}"/>
+          </ac:picMkLst>
+        </pc:picChg>
+        <pc:picChg chg="add mod">
+          <ac:chgData name="Tomi Lind" userId="73fe6e1701840021" providerId="LiveId" clId="{AA8653F4-E423-4F5B-B596-0F4968636A06}" dt="2024-03-15T19:41:10.438" v="433" actId="571"/>
+          <ac:picMkLst>
+            <pc:docMk/>
+            <pc:sldMk cId="110841472" sldId="263"/>
+            <ac:picMk id="11" creationId="{1D558CAC-0B18-3DE0-72BA-09A043B369D1}"/>
+          </ac:picMkLst>
+        </pc:picChg>
+        <pc:picChg chg="add mod">
+          <ac:chgData name="Tomi Lind" userId="73fe6e1701840021" providerId="LiveId" clId="{AA8653F4-E423-4F5B-B596-0F4968636A06}" dt="2024-03-15T19:41:19.513" v="435" actId="571"/>
+          <ac:picMkLst>
+            <pc:docMk/>
+            <pc:sldMk cId="110841472" sldId="263"/>
+            <ac:picMk id="15" creationId="{C2B46F1A-42DA-9338-34CF-969710E3E778}"/>
+          </ac:picMkLst>
+        </pc:picChg>
+        <pc:picChg chg="add mod">
+          <ac:chgData name="Tomi Lind" userId="73fe6e1701840021" providerId="LiveId" clId="{AA8653F4-E423-4F5B-B596-0F4968636A06}" dt="2024-03-15T19:41:28.797" v="437" actId="571"/>
+          <ac:picMkLst>
+            <pc:docMk/>
+            <pc:sldMk cId="110841472" sldId="263"/>
+            <ac:picMk id="19" creationId="{0AF54BAB-F16E-916C-838A-8BD3E9D1222A}"/>
+          </ac:picMkLst>
+        </pc:picChg>
+        <pc:picChg chg="add mod">
+          <ac:chgData name="Tomi Lind" userId="73fe6e1701840021" providerId="LiveId" clId="{AA8653F4-E423-4F5B-B596-0F4968636A06}" dt="2024-03-15T19:43:40.795" v="463" actId="571"/>
+          <ac:picMkLst>
+            <pc:docMk/>
+            <pc:sldMk cId="110841472" sldId="263"/>
+            <ac:picMk id="20" creationId="{A3CD18EB-E5BD-A2AE-4E0F-5AD447616A9C}"/>
+          </ac:picMkLst>
+        </pc:picChg>
+      </pc:sldChg>
+      <pc:sldChg chg="add del setBg">
+        <pc:chgData name="Tomi Lind" userId="73fe6e1701840021" providerId="LiveId" clId="{AA8653F4-E423-4F5B-B596-0F4968636A06}" dt="2024-03-15T20:00:41.819" v="491" actId="47"/>
+        <pc:sldMkLst>
+          <pc:docMk/>
+          <pc:sldMk cId="3117620867" sldId="264"/>
+        </pc:sldMkLst>
       </pc:sldChg>
     </pc:docChg>
   </pc:docChgLst>
@@ -3628,45 +4076,6 @@
           <a:chExt cx="0" cy="0"/>
         </a:xfrm>
       </p:grpSpPr>
-      <p:pic>
-        <p:nvPicPr>
-          <p:cNvPr id="8" name="Graphic 7">
-            <a:extLst>
-              <a:ext uri="{FF2B5EF4-FFF2-40B4-BE49-F238E27FC236}">
-                <a16:creationId xmlns:a16="http://schemas.microsoft.com/office/drawing/2014/main" id="{C8C7D250-F7FA-F5AD-F725-AF2E29BC85E5}"/>
-              </a:ext>
-            </a:extLst>
-          </p:cNvPr>
-          <p:cNvPicPr>
-            <a:picLocks noChangeAspect="1"/>
-          </p:cNvPicPr>
-          <p:nvPr/>
-        </p:nvPicPr>
-        <p:blipFill>
-          <a:blip r:embed="rId2">
-            <a:extLst>
-              <a:ext uri="{28A0092B-C50C-407E-A947-70E740481C1C}">
-                <a14:useLocalDpi xmlns:a14="http://schemas.microsoft.com/office/drawing/2010/main" val="0"/>
-              </a:ext>
-              <a:ext uri="{96DAC541-7B7A-43D3-8B79-37D633B846F1}">
-                <asvg:svgBlip xmlns:asvg="http://schemas.microsoft.com/office/drawing/2016/SVG/main" r:embed="rId3"/>
-              </a:ext>
-            </a:extLst>
-          </a:blip>
-          <a:stretch>
-            <a:fillRect/>
-          </a:stretch>
-        </p:blipFill>
-        <p:spPr>
-          <a:xfrm>
-            <a:off x="0" y="0"/>
-            <a:ext cx="3240088" cy="3240088"/>
-          </a:xfrm>
-          <a:prstGeom prst="rect">
-            <a:avLst/>
-          </a:prstGeom>
-        </p:spPr>
-      </p:pic>
       <p:grpSp>
         <p:nvGrpSpPr>
           <p:cNvPr id="38" name="Group 37">
@@ -3681,10 +4090,10 @@
         </p:nvGrpSpPr>
         <p:grpSpPr>
           <a:xfrm>
-            <a:off x="2523952" y="126788"/>
-            <a:ext cx="6795089" cy="2799871"/>
-            <a:chOff x="2523951" y="306968"/>
-            <a:chExt cx="6795089" cy="2799872"/>
+            <a:off x="2520777" y="126788"/>
+            <a:ext cx="6795089" cy="2778867"/>
+            <a:chOff x="2523951" y="345068"/>
+            <a:chExt cx="6795089" cy="2778868"/>
           </a:xfrm>
         </p:grpSpPr>
         <p:sp>
@@ -3703,7 +4112,7 @@
           </p:nvSpPr>
           <p:spPr bwMode="auto">
             <a:xfrm>
-              <a:off x="2523951" y="306968"/>
+              <a:off x="2523951" y="345068"/>
               <a:ext cx="6795089" cy="2182153"/>
             </a:xfrm>
             <a:prstGeom prst="rect">
@@ -3790,8 +4199,8 @@
           </p:nvSpPr>
           <p:spPr bwMode="auto">
             <a:xfrm>
-              <a:off x="2757267" y="2325831"/>
-              <a:ext cx="6379698" cy="781009"/>
+              <a:off x="2776855" y="2342927"/>
+              <a:ext cx="6408420" cy="781009"/>
             </a:xfrm>
             <a:prstGeom prst="rect">
               <a:avLst/>
@@ -3847,25 +4256,64 @@
                 </a:spcAft>
               </a:pPr>
               <a:r>
-                <a:rPr lang="en-FI" altLang="en-FI" sz="5500" i="1" dirty="0">
+                <a:rPr lang="en-FI" altLang="en-FI" sz="6000" b="1" i="1" dirty="0">
                   <a:solidFill>
                     <a:srgbClr val="4D4D4D"/>
                   </a:solidFill>
-                  <a:latin typeface="Calibri" panose="020F0502020204030204" pitchFamily="34" charset="0"/>
+                  <a:latin typeface="Ubuntu" panose="020B0504030602030204" pitchFamily="34" charset="0"/>
                 </a:rPr>
-                <a:t>LIGHTNING NETWORK</a:t>
+                <a:t>lightning network</a:t>
               </a:r>
-              <a:endParaRPr lang="en-FI" altLang="en-FI" sz="5500" dirty="0">
-                <a:latin typeface="Arial" panose="020B0604020202020204" pitchFamily="34" charset="0"/>
+              <a:endParaRPr lang="en-FI" altLang="en-FI" sz="6000" b="1" dirty="0">
+                <a:latin typeface="Ubuntu" panose="020B0504030602030204" pitchFamily="34" charset="0"/>
               </a:endParaRPr>
             </a:p>
           </p:txBody>
         </p:sp>
       </p:grpSp>
+      <p:pic>
+        <p:nvPicPr>
+          <p:cNvPr id="5" name="Graphic 4">
+            <a:extLst>
+              <a:ext uri="{FF2B5EF4-FFF2-40B4-BE49-F238E27FC236}">
+                <a16:creationId xmlns:a16="http://schemas.microsoft.com/office/drawing/2014/main" id="{72D4F2BF-45F1-F1D5-A779-2C48D034B8A8}"/>
+              </a:ext>
+            </a:extLst>
+          </p:cNvPr>
+          <p:cNvPicPr>
+            <a:picLocks noChangeAspect="1"/>
+          </p:cNvPicPr>
+          <p:nvPr/>
+        </p:nvPicPr>
+        <p:blipFill>
+          <a:blip r:embed="rId2">
+            <a:extLst>
+              <a:ext uri="{28A0092B-C50C-407E-A947-70E740481C1C}">
+                <a14:useLocalDpi xmlns:a14="http://schemas.microsoft.com/office/drawing/2010/main" val="0"/>
+              </a:ext>
+              <a:ext uri="{96DAC541-7B7A-43D3-8B79-37D633B846F1}">
+                <asvg:svgBlip xmlns:asvg="http://schemas.microsoft.com/office/drawing/2016/SVG/main" r:embed="rId3"/>
+              </a:ext>
+            </a:extLst>
+          </a:blip>
+          <a:stretch>
+            <a:fillRect/>
+          </a:stretch>
+        </p:blipFill>
+        <p:spPr>
+          <a:xfrm>
+            <a:off x="0" y="0"/>
+            <a:ext cx="3054350" cy="3054350"/>
+          </a:xfrm>
+          <a:prstGeom prst="rect">
+            <a:avLst/>
+          </a:prstGeom>
+        </p:spPr>
+      </p:pic>
     </p:spTree>
     <p:extLst>
       <p:ext uri="{BB962C8B-B14F-4D97-AF65-F5344CB8AC3E}">
-        <p14:creationId xmlns:p14="http://schemas.microsoft.com/office/powerpoint/2010/main" val="560821162"/>
+        <p14:creationId xmlns:p14="http://schemas.microsoft.com/office/powerpoint/2010/main" val="110841472"/>
       </p:ext>
     </p:extLst>
   </p:cSld>

</xml_diff>